<commit_message>
add extra slide for site url
</commit_message>
<xml_diff>
--- a/HelloPy/HelloPython.pptx
+++ b/HelloPy/HelloPython.pptx
@@ -5,7 +5,7 @@
     <p:sldMasterId id="2147483648" r:id="rId1"/>
   </p:sldMasterIdLst>
   <p:notesMasterIdLst>
-    <p:notesMasterId r:id="rId13"/>
+    <p:notesMasterId r:id="rId14"/>
   </p:notesMasterIdLst>
   <p:sldIdLst>
     <p:sldId id="256" r:id="rId2"/>
@@ -19,6 +19,7 @@
     <p:sldId id="297" r:id="rId10"/>
     <p:sldId id="299" r:id="rId11"/>
     <p:sldId id="257" r:id="rId12"/>
+    <p:sldId id="306" r:id="rId13"/>
   </p:sldIdLst>
   <p:sldSz cx="12192000" cy="6858000"/>
   <p:notesSz cx="6858000" cy="9144000"/>
@@ -207,7 +208,7 @@
           <a:p>
             <a:fld id="{49166821-6C76-43B4-90ED-EC04C965C0EE}" type="datetimeFigureOut">
               <a:rPr lang="en-US" smtClean="0"/>
-              <a:t>9/7/2023</a:t>
+              <a:t>2/29/2024</a:t>
             </a:fld>
             <a:endParaRPr lang="en-US"/>
           </a:p>
@@ -800,6 +801,94 @@
 </p:notes>
 </file>
 
+<file path=ppt/notesSlides/notesSlide12.xml><?xml version="1.0" encoding="utf-8"?>
+<p:notes xmlns:a="http://schemas.openxmlformats.org/drawingml/2006/main" xmlns:r="http://schemas.openxmlformats.org/officeDocument/2006/relationships" xmlns:p="http://schemas.openxmlformats.org/presentationml/2006/main">
+  <p:cSld>
+    <p:spTree>
+      <p:nvGrpSpPr>
+        <p:cNvPr id="1" name=""/>
+        <p:cNvGrpSpPr/>
+        <p:nvPr/>
+      </p:nvGrpSpPr>
+      <p:grpSpPr>
+        <a:xfrm>
+          <a:off x="0" y="0"/>
+          <a:ext cx="0" cy="0"/>
+          <a:chOff x="0" y="0"/>
+          <a:chExt cx="0" cy="0"/>
+        </a:xfrm>
+      </p:grpSpPr>
+      <p:sp>
+        <p:nvSpPr>
+          <p:cNvPr id="2" name="Slide Image Placeholder 1"/>
+          <p:cNvSpPr>
+            <a:spLocks noGrp="1" noRot="1" noChangeAspect="1"/>
+          </p:cNvSpPr>
+          <p:nvPr>
+            <p:ph type="sldImg"/>
+          </p:nvPr>
+        </p:nvSpPr>
+        <p:spPr/>
+      </p:sp>
+      <p:sp>
+        <p:nvSpPr>
+          <p:cNvPr id="3" name="Notes Placeholder 2"/>
+          <p:cNvSpPr>
+            <a:spLocks noGrp="1"/>
+          </p:cNvSpPr>
+          <p:nvPr>
+            <p:ph type="body" idx="1"/>
+          </p:nvPr>
+        </p:nvSpPr>
+        <p:spPr/>
+        <p:txBody>
+          <a:bodyPr/>
+          <a:lstStyle/>
+          <a:p>
+            <a:pPr marL="0" indent="0">
+              <a:buFont typeface="Arial" panose="020B0604020202020204" pitchFamily="34" charset="0"/>
+              <a:buNone/>
+            </a:pPr>
+            <a:endParaRPr lang="en-US" dirty="0"/>
+          </a:p>
+        </p:txBody>
+      </p:sp>
+      <p:sp>
+        <p:nvSpPr>
+          <p:cNvPr id="4" name="Slide Number Placeholder 3"/>
+          <p:cNvSpPr>
+            <a:spLocks noGrp="1"/>
+          </p:cNvSpPr>
+          <p:nvPr>
+            <p:ph type="sldNum" sz="quarter" idx="5"/>
+          </p:nvPr>
+        </p:nvSpPr>
+        <p:spPr/>
+        <p:txBody>
+          <a:bodyPr/>
+          <a:lstStyle/>
+          <a:p>
+            <a:fld id="{58794465-180C-46F3-B270-18D6C421C221}" type="slidenum">
+              <a:rPr lang="en-US" smtClean="0"/>
+              <a:t>12</a:t>
+            </a:fld>
+            <a:endParaRPr lang="en-US"/>
+          </a:p>
+        </p:txBody>
+      </p:sp>
+    </p:spTree>
+    <p:extLst>
+      <p:ext uri="{BB962C8B-B14F-4D97-AF65-F5344CB8AC3E}">
+        <p14:creationId xmlns:p14="http://schemas.microsoft.com/office/powerpoint/2010/main" val="3608611899"/>
+      </p:ext>
+    </p:extLst>
+  </p:cSld>
+  <p:clrMapOvr>
+    <a:masterClrMapping/>
+  </p:clrMapOvr>
+</p:notes>
+</file>
+
 <file path=ppt/notesSlides/notesSlide2.xml><?xml version="1.0" encoding="utf-8"?>
 <p:notes xmlns:a="http://schemas.openxmlformats.org/drawingml/2006/main" xmlns:r="http://schemas.openxmlformats.org/officeDocument/2006/relationships" xmlns:p="http://schemas.openxmlformats.org/presentationml/2006/main">
   <p:cSld>
@@ -1957,7 +2046,7 @@
           <a:p>
             <a:fld id="{9ED8E289-1C12-4E95-8FE8-FF2F994E0C49}" type="datetimeFigureOut">
               <a:rPr lang="en-US" smtClean="0"/>
-              <a:t>9/7/2023</a:t>
+              <a:t>2/29/2024</a:t>
             </a:fld>
             <a:endParaRPr lang="en-US"/>
           </a:p>
@@ -2155,7 +2244,7 @@
           <a:p>
             <a:fld id="{9ED8E289-1C12-4E95-8FE8-FF2F994E0C49}" type="datetimeFigureOut">
               <a:rPr lang="en-US" smtClean="0"/>
-              <a:t>9/7/2023</a:t>
+              <a:t>2/29/2024</a:t>
             </a:fld>
             <a:endParaRPr lang="en-US"/>
           </a:p>
@@ -2363,7 +2452,7 @@
           <a:p>
             <a:fld id="{9ED8E289-1C12-4E95-8FE8-FF2F994E0C49}" type="datetimeFigureOut">
               <a:rPr lang="en-US" smtClean="0"/>
-              <a:t>9/7/2023</a:t>
+              <a:t>2/29/2024</a:t>
             </a:fld>
             <a:endParaRPr lang="en-US"/>
           </a:p>
@@ -2561,7 +2650,7 @@
           <a:p>
             <a:fld id="{9ED8E289-1C12-4E95-8FE8-FF2F994E0C49}" type="datetimeFigureOut">
               <a:rPr lang="en-US" smtClean="0"/>
-              <a:t>9/7/2023</a:t>
+              <a:t>2/29/2024</a:t>
             </a:fld>
             <a:endParaRPr lang="en-US"/>
           </a:p>
@@ -2836,7 +2925,7 @@
           <a:p>
             <a:fld id="{9ED8E289-1C12-4E95-8FE8-FF2F994E0C49}" type="datetimeFigureOut">
               <a:rPr lang="en-US" smtClean="0"/>
-              <a:t>9/7/2023</a:t>
+              <a:t>2/29/2024</a:t>
             </a:fld>
             <a:endParaRPr lang="en-US"/>
           </a:p>
@@ -3101,7 +3190,7 @@
           <a:p>
             <a:fld id="{9ED8E289-1C12-4E95-8FE8-FF2F994E0C49}" type="datetimeFigureOut">
               <a:rPr lang="en-US" smtClean="0"/>
-              <a:t>9/7/2023</a:t>
+              <a:t>2/29/2024</a:t>
             </a:fld>
             <a:endParaRPr lang="en-US"/>
           </a:p>
@@ -3513,7 +3602,7 @@
           <a:p>
             <a:fld id="{9ED8E289-1C12-4E95-8FE8-FF2F994E0C49}" type="datetimeFigureOut">
               <a:rPr lang="en-US" smtClean="0"/>
-              <a:t>9/7/2023</a:t>
+              <a:t>2/29/2024</a:t>
             </a:fld>
             <a:endParaRPr lang="en-US"/>
           </a:p>
@@ -3654,7 +3743,7 @@
           <a:p>
             <a:fld id="{9ED8E289-1C12-4E95-8FE8-FF2F994E0C49}" type="datetimeFigureOut">
               <a:rPr lang="en-US" smtClean="0"/>
-              <a:t>9/7/2023</a:t>
+              <a:t>2/29/2024</a:t>
             </a:fld>
             <a:endParaRPr lang="en-US"/>
           </a:p>
@@ -3767,7 +3856,7 @@
           <a:p>
             <a:fld id="{9ED8E289-1C12-4E95-8FE8-FF2F994E0C49}" type="datetimeFigureOut">
               <a:rPr lang="en-US" smtClean="0"/>
-              <a:t>9/7/2023</a:t>
+              <a:t>2/29/2024</a:t>
             </a:fld>
             <a:endParaRPr lang="en-US"/>
           </a:p>
@@ -4078,7 +4167,7 @@
           <a:p>
             <a:fld id="{9ED8E289-1C12-4E95-8FE8-FF2F994E0C49}" type="datetimeFigureOut">
               <a:rPr lang="en-US" smtClean="0"/>
-              <a:t>9/7/2023</a:t>
+              <a:t>2/29/2024</a:t>
             </a:fld>
             <a:endParaRPr lang="en-US"/>
           </a:p>
@@ -4366,7 +4455,7 @@
           <a:p>
             <a:fld id="{9ED8E289-1C12-4E95-8FE8-FF2F994E0C49}" type="datetimeFigureOut">
               <a:rPr lang="en-US" smtClean="0"/>
-              <a:t>9/7/2023</a:t>
+              <a:t>2/29/2024</a:t>
             </a:fld>
             <a:endParaRPr lang="en-US"/>
           </a:p>
@@ -4607,7 +4696,7 @@
           <a:p>
             <a:fld id="{9ED8E289-1C12-4E95-8FE8-FF2F994E0C49}" type="datetimeFigureOut">
               <a:rPr lang="en-US" smtClean="0"/>
-              <a:t>9/7/2023</a:t>
+              <a:t>2/29/2024</a:t>
             </a:fld>
             <a:endParaRPr lang="en-US"/>
           </a:p>
@@ -5213,13 +5302,13 @@
   <p:clrMapOvr>
     <a:masterClrMapping/>
   </p:clrMapOvr>
-  <mc:AlternateContent xmlns:mc="http://schemas.openxmlformats.org/markup-compatibility/2006">
-    <mc:Choice xmlns:p159="http://schemas.microsoft.com/office/powerpoint/2015/09/main" Requires="p159">
+  <mc:AlternateContent xmlns:mc="http://schemas.openxmlformats.org/markup-compatibility/2006" xmlns:p159="http://schemas.microsoft.com/office/powerpoint/2015/09/main">
+    <mc:Choice Requires="p159">
       <p:transition xmlns:p14="http://schemas.microsoft.com/office/powerpoint/2010/main" spd="slow" p14:dur="2000">
         <p159:morph option="byObject"/>
       </p:transition>
     </mc:Choice>
-    <mc:Fallback>
+    <mc:Fallback xmlns="">
       <p:transition spd="slow">
         <p:fade/>
       </p:transition>
@@ -6055,13 +6144,13 @@
   <p:clrMapOvr>
     <a:masterClrMapping/>
   </p:clrMapOvr>
-  <mc:AlternateContent xmlns:mc="http://schemas.openxmlformats.org/markup-compatibility/2006">
-    <mc:Choice xmlns:p159="http://schemas.microsoft.com/office/powerpoint/2015/09/main" Requires="p159">
+  <mc:AlternateContent xmlns:mc="http://schemas.openxmlformats.org/markup-compatibility/2006" xmlns:p159="http://schemas.microsoft.com/office/powerpoint/2015/09/main">
+    <mc:Choice Requires="p159">
       <p:transition xmlns:p14="http://schemas.microsoft.com/office/powerpoint/2010/main" spd="slow" p14:dur="2000">
         <p159:morph option="byObject"/>
       </p:transition>
     </mc:Choice>
-    <mc:Fallback>
+    <mc:Fallback xmlns="">
       <p:transition spd="slow">
         <p:fade/>
       </p:transition>
@@ -6412,13 +6501,13 @@
   <p:clrMapOvr>
     <a:masterClrMapping/>
   </p:clrMapOvr>
-  <mc:AlternateContent xmlns:mc="http://schemas.openxmlformats.org/markup-compatibility/2006">
-    <mc:Choice xmlns:p159="http://schemas.microsoft.com/office/powerpoint/2015/09/main" Requires="p159">
+  <mc:AlternateContent xmlns:mc="http://schemas.openxmlformats.org/markup-compatibility/2006" xmlns:p159="http://schemas.microsoft.com/office/powerpoint/2015/09/main">
+    <mc:Choice Requires="p159">
       <p:transition xmlns:p14="http://schemas.microsoft.com/office/powerpoint/2010/main" spd="slow" p14:dur="2000">
         <p159:morph option="byObject"/>
       </p:transition>
     </mc:Choice>
-    <mc:Fallback>
+    <mc:Fallback xmlns="">
       <p:transition spd="slow">
         <p:fade/>
       </p:transition>
@@ -6545,6 +6634,187 @@
       </p:par>
     </p:tnLst>
   </p:timing>
+</p:sld>
+</file>
+
+<file path=ppt/slides/slide12.xml><?xml version="1.0" encoding="utf-8"?>
+<p:sld xmlns:a="http://schemas.openxmlformats.org/drawingml/2006/main" xmlns:r="http://schemas.openxmlformats.org/officeDocument/2006/relationships" xmlns:p="http://schemas.openxmlformats.org/presentationml/2006/main">
+  <p:cSld>
+    <p:bg>
+      <p:bgPr>
+        <a:solidFill>
+          <a:schemeClr val="bg1">
+            <a:lumMod val="90000"/>
+            <a:lumOff val="10000"/>
+          </a:schemeClr>
+        </a:solidFill>
+        <a:effectLst/>
+      </p:bgPr>
+    </p:bg>
+    <p:spTree>
+      <p:nvGrpSpPr>
+        <p:cNvPr id="1" name=""/>
+        <p:cNvGrpSpPr/>
+        <p:nvPr/>
+      </p:nvGrpSpPr>
+      <p:grpSpPr>
+        <a:xfrm>
+          <a:off x="0" y="0"/>
+          <a:ext cx="0" cy="0"/>
+          <a:chOff x="0" y="0"/>
+          <a:chExt cx="0" cy="0"/>
+        </a:xfrm>
+      </p:grpSpPr>
+      <p:sp>
+        <p:nvSpPr>
+          <p:cNvPr id="2" name="Title 1">
+            <a:extLst>
+              <a:ext uri="{FF2B5EF4-FFF2-40B4-BE49-F238E27FC236}">
+                <a16:creationId xmlns:a16="http://schemas.microsoft.com/office/drawing/2014/main" id="{4DD820D6-5715-AFD0-11FC-17CC585EBE2B}"/>
+              </a:ext>
+            </a:extLst>
+          </p:cNvPr>
+          <p:cNvSpPr>
+            <a:spLocks noGrp="1"/>
+          </p:cNvSpPr>
+          <p:nvPr>
+            <p:ph type="title"/>
+          </p:nvPr>
+        </p:nvSpPr>
+        <p:spPr>
+          <a:xfrm>
+            <a:off x="0" y="1"/>
+            <a:ext cx="12192000" cy="1120140"/>
+          </a:xfrm>
+        </p:spPr>
+        <p:txBody>
+          <a:bodyPr/>
+          <a:lstStyle/>
+          <a:p>
+            <a:pPr algn="ctr"/>
+            <a:r>
+              <a:rPr lang="en-US" dirty="0"/>
+              <a:t>Go to</a:t>
+            </a:r>
+            <a:r>
+              <a:rPr lang="en-US" b="1" dirty="0"/>
+              <a:t> tinyurl.com/</a:t>
+            </a:r>
+            <a:r>
+              <a:rPr lang="en-US" b="1" dirty="0" err="1"/>
+              <a:t>ucspy</a:t>
+            </a:r>
+            <a:endParaRPr lang="en-US" b="1" dirty="0"/>
+          </a:p>
+        </p:txBody>
+      </p:sp>
+      <p:pic>
+        <p:nvPicPr>
+          <p:cNvPr id="5" name="Picture 4">
+            <a:extLst>
+              <a:ext uri="{FF2B5EF4-FFF2-40B4-BE49-F238E27FC236}">
+                <a16:creationId xmlns:a16="http://schemas.microsoft.com/office/drawing/2014/main" id="{C3D79FA3-CA32-AC9F-3813-BCDA12D9B547}"/>
+              </a:ext>
+            </a:extLst>
+          </p:cNvPr>
+          <p:cNvPicPr>
+            <a:picLocks noChangeAspect="1"/>
+          </p:cNvPicPr>
+          <p:nvPr/>
+        </p:nvPicPr>
+        <p:blipFill>
+          <a:blip r:embed="rId3"/>
+          <a:stretch>
+            <a:fillRect/>
+          </a:stretch>
+        </p:blipFill>
+        <p:spPr>
+          <a:xfrm>
+            <a:off x="0" y="1120141"/>
+            <a:ext cx="12192000" cy="4762999"/>
+          </a:xfrm>
+          <a:prstGeom prst="rect">
+            <a:avLst/>
+          </a:prstGeom>
+        </p:spPr>
+      </p:pic>
+      <p:sp>
+        <p:nvSpPr>
+          <p:cNvPr id="6" name="Title 1">
+            <a:extLst>
+              <a:ext uri="{FF2B5EF4-FFF2-40B4-BE49-F238E27FC236}">
+                <a16:creationId xmlns:a16="http://schemas.microsoft.com/office/drawing/2014/main" id="{474CADB9-3632-F95E-8DCE-8B7DC57130CE}"/>
+              </a:ext>
+            </a:extLst>
+          </p:cNvPr>
+          <p:cNvSpPr txBox="1">
+            <a:spLocks/>
+          </p:cNvSpPr>
+          <p:nvPr/>
+        </p:nvSpPr>
+        <p:spPr>
+          <a:xfrm>
+            <a:off x="0" y="6111740"/>
+            <a:ext cx="12192000" cy="560070"/>
+          </a:xfrm>
+          <a:prstGeom prst="rect">
+            <a:avLst/>
+          </a:prstGeom>
+        </p:spPr>
+        <p:txBody>
+          <a:bodyPr vert="horz" lIns="91440" tIns="45720" rIns="91440" bIns="45720" rtlCol="0" anchor="ctr">
+            <a:normAutofit/>
+          </a:bodyPr>
+          <a:lstStyle>
+            <a:lvl1pPr algn="l" defTabSz="914400" rtl="0" eaLnBrk="1" latinLnBrk="0" hangingPunct="1">
+              <a:lnSpc>
+                <a:spcPct val="90000"/>
+              </a:lnSpc>
+              <a:spcBef>
+                <a:spcPct val="0"/>
+              </a:spcBef>
+              <a:buNone/>
+              <a:defRPr sz="4400" kern="1200">
+                <a:solidFill>
+                  <a:schemeClr val="tx1"/>
+                </a:solidFill>
+                <a:latin typeface="+mj-lt"/>
+                <a:ea typeface="+mj-ea"/>
+                <a:cs typeface="+mj-cs"/>
+              </a:defRPr>
+            </a:lvl1pPr>
+          </a:lstStyle>
+          <a:p>
+            <a:pPr algn="ctr"/>
+            <a:r>
+              <a:rPr lang="en-US" sz="2400" i="1" dirty="0"/>
+              <a:t>🔖 please bookmark the page 🔖</a:t>
+            </a:r>
+          </a:p>
+        </p:txBody>
+      </p:sp>
+    </p:spTree>
+    <p:extLst>
+      <p:ext uri="{BB962C8B-B14F-4D97-AF65-F5344CB8AC3E}">
+        <p14:creationId xmlns:p14="http://schemas.microsoft.com/office/powerpoint/2010/main" val="2526916344"/>
+      </p:ext>
+    </p:extLst>
+  </p:cSld>
+  <p:clrMapOvr>
+    <a:masterClrMapping/>
+  </p:clrMapOvr>
+  <mc:AlternateContent xmlns:mc="http://schemas.openxmlformats.org/markup-compatibility/2006">
+    <mc:Choice xmlns:p159="http://schemas.microsoft.com/office/powerpoint/2015/09/main" Requires="p159">
+      <p:transition xmlns:p14="http://schemas.microsoft.com/office/powerpoint/2010/main" spd="slow" p14:dur="2000">
+        <p159:morph option="byObject"/>
+      </p:transition>
+    </mc:Choice>
+    <mc:Fallback>
+      <p:transition spd="slow">
+        <p:fade/>
+      </p:transition>
+    </mc:Fallback>
+  </mc:AlternateContent>
 </p:sld>
 </file>
 
@@ -6897,13 +7167,13 @@
   <p:clrMapOvr>
     <a:masterClrMapping/>
   </p:clrMapOvr>
-  <mc:AlternateContent xmlns:mc="http://schemas.openxmlformats.org/markup-compatibility/2006">
-    <mc:Choice xmlns:p159="http://schemas.microsoft.com/office/powerpoint/2015/09/main" Requires="p159">
+  <mc:AlternateContent xmlns:mc="http://schemas.openxmlformats.org/markup-compatibility/2006" xmlns:p159="http://schemas.microsoft.com/office/powerpoint/2015/09/main">
+    <mc:Choice Requires="p159">
       <p:transition xmlns:p14="http://schemas.microsoft.com/office/powerpoint/2010/main" spd="slow" p14:dur="2000">
         <p159:morph option="byObject"/>
       </p:transition>
     </mc:Choice>
-    <mc:Fallback>
+    <mc:Fallback xmlns="">
       <p:transition spd="slow">
         <p:fade/>
       </p:transition>
@@ -7891,13 +8161,13 @@
   <p:clrMapOvr>
     <a:masterClrMapping/>
   </p:clrMapOvr>
-  <mc:AlternateContent xmlns:mc="http://schemas.openxmlformats.org/markup-compatibility/2006">
-    <mc:Choice xmlns:p159="http://schemas.microsoft.com/office/powerpoint/2015/09/main" Requires="p159">
+  <mc:AlternateContent xmlns:mc="http://schemas.openxmlformats.org/markup-compatibility/2006" xmlns:p159="http://schemas.microsoft.com/office/powerpoint/2015/09/main">
+    <mc:Choice Requires="p159">
       <p:transition xmlns:p14="http://schemas.microsoft.com/office/powerpoint/2010/main" spd="slow" p14:dur="2000">
         <p159:morph option="byObject"/>
       </p:transition>
     </mc:Choice>
-    <mc:Fallback>
+    <mc:Fallback xmlns="">
       <p:transition spd="slow">
         <p:fade/>
       </p:transition>
@@ -11332,13 +11602,13 @@
   <p:clrMapOvr>
     <a:masterClrMapping/>
   </p:clrMapOvr>
-  <mc:AlternateContent xmlns:mc="http://schemas.openxmlformats.org/markup-compatibility/2006">
-    <mc:Choice xmlns:p159="http://schemas.microsoft.com/office/powerpoint/2015/09/main" Requires="p159">
+  <mc:AlternateContent xmlns:mc="http://schemas.openxmlformats.org/markup-compatibility/2006" xmlns:p159="http://schemas.microsoft.com/office/powerpoint/2015/09/main">
+    <mc:Choice Requires="p159">
       <p:transition xmlns:p14="http://schemas.microsoft.com/office/powerpoint/2010/main" spd="slow" p14:dur="2000">
         <p159:morph option="byObject"/>
       </p:transition>
     </mc:Choice>
-    <mc:Fallback>
+    <mc:Fallback xmlns="">
       <p:transition spd="slow">
         <p:fade/>
       </p:transition>
@@ -12274,13 +12544,13 @@
   <p:clrMapOvr>
     <a:masterClrMapping/>
   </p:clrMapOvr>
-  <mc:AlternateContent xmlns:mc="http://schemas.openxmlformats.org/markup-compatibility/2006">
-    <mc:Choice xmlns:p159="http://schemas.microsoft.com/office/powerpoint/2015/09/main" Requires="p159">
+  <mc:AlternateContent xmlns:mc="http://schemas.openxmlformats.org/markup-compatibility/2006" xmlns:p159="http://schemas.microsoft.com/office/powerpoint/2015/09/main">
+    <mc:Choice Requires="p159">
       <p:transition xmlns:p14="http://schemas.microsoft.com/office/powerpoint/2010/main" spd="slow" p14:dur="2000">
         <p159:morph option="byObject"/>
       </p:transition>
     </mc:Choice>
-    <mc:Fallback>
+    <mc:Fallback xmlns="">
       <p:transition spd="slow">
         <p:fade/>
       </p:transition>
@@ -15933,13 +16203,13 @@
   <p:clrMapOvr>
     <a:masterClrMapping/>
   </p:clrMapOvr>
-  <mc:AlternateContent xmlns:mc="http://schemas.openxmlformats.org/markup-compatibility/2006">
-    <mc:Choice xmlns:p159="http://schemas.microsoft.com/office/powerpoint/2015/09/main" Requires="p159">
+  <mc:AlternateContent xmlns:mc="http://schemas.openxmlformats.org/markup-compatibility/2006" xmlns:p159="http://schemas.microsoft.com/office/powerpoint/2015/09/main">
+    <mc:Choice Requires="p159">
       <p:transition xmlns:p14="http://schemas.microsoft.com/office/powerpoint/2010/main" spd="slow" p14:dur="2000">
         <p159:morph option="byObject"/>
       </p:transition>
     </mc:Choice>
-    <mc:Fallback>
+    <mc:Fallback xmlns="">
       <p:transition spd="slow">
         <p:fade/>
       </p:transition>
@@ -16528,13 +16798,13 @@
   <p:clrMapOvr>
     <a:masterClrMapping/>
   </p:clrMapOvr>
-  <mc:AlternateContent xmlns:mc="http://schemas.openxmlformats.org/markup-compatibility/2006">
-    <mc:Choice xmlns:p159="http://schemas.microsoft.com/office/powerpoint/2015/09/main" Requires="p159">
+  <mc:AlternateContent xmlns:mc="http://schemas.openxmlformats.org/markup-compatibility/2006" xmlns:p159="http://schemas.microsoft.com/office/powerpoint/2015/09/main">
+    <mc:Choice Requires="p159">
       <p:transition xmlns:p14="http://schemas.microsoft.com/office/powerpoint/2010/main" spd="slow" p14:dur="2000">
         <p159:morph option="byObject"/>
       </p:transition>
     </mc:Choice>
-    <mc:Fallback>
+    <mc:Fallback xmlns="">
       <p:transition spd="slow">
         <p:fade/>
       </p:transition>
@@ -17280,13 +17550,13 @@
   <p:clrMapOvr>
     <a:masterClrMapping/>
   </p:clrMapOvr>
-  <mc:AlternateContent xmlns:mc="http://schemas.openxmlformats.org/markup-compatibility/2006">
-    <mc:Choice xmlns:p159="http://schemas.microsoft.com/office/powerpoint/2015/09/main" Requires="p159">
+  <mc:AlternateContent xmlns:mc="http://schemas.openxmlformats.org/markup-compatibility/2006" xmlns:p159="http://schemas.microsoft.com/office/powerpoint/2015/09/main">
+    <mc:Choice Requires="p159">
       <p:transition xmlns:p14="http://schemas.microsoft.com/office/powerpoint/2010/main" spd="slow" p14:dur="2000">
         <p159:morph option="byObject"/>
       </p:transition>
     </mc:Choice>
-    <mc:Fallback>
+    <mc:Fallback xmlns="">
       <p:transition spd="slow">
         <p:fade/>
       </p:transition>
@@ -18378,13 +18648,13 @@
   <p:clrMapOvr>
     <a:masterClrMapping/>
   </p:clrMapOvr>
-  <mc:AlternateContent xmlns:mc="http://schemas.openxmlformats.org/markup-compatibility/2006">
-    <mc:Choice xmlns:p159="http://schemas.microsoft.com/office/powerpoint/2015/09/main" Requires="p159">
+  <mc:AlternateContent xmlns:mc="http://schemas.openxmlformats.org/markup-compatibility/2006" xmlns:p159="http://schemas.microsoft.com/office/powerpoint/2015/09/main">
+    <mc:Choice Requires="p159">
       <p:transition xmlns:p14="http://schemas.microsoft.com/office/powerpoint/2010/main" spd="slow" p14:dur="2000">
         <p159:morph option="byObject"/>
       </p:transition>
     </mc:Choice>
-    <mc:Fallback>
+    <mc:Fallback xmlns="">
       <p:transition spd="slow">
         <p:fade/>
       </p:transition>

</xml_diff>

<commit_message>
Update gitbook 2024-02-29 19:09:49
</commit_message>
<xml_diff>
--- a/HelloPy/HelloPython.pptx
+++ b/HelloPy/HelloPython.pptx
@@ -5,7 +5,7 @@
     <p:sldMasterId id="2147483648" r:id="rId1"/>
   </p:sldMasterIdLst>
   <p:notesMasterIdLst>
-    <p:notesMasterId r:id="rId13"/>
+    <p:notesMasterId r:id="rId14"/>
   </p:notesMasterIdLst>
   <p:sldIdLst>
     <p:sldId id="256" r:id="rId2"/>
@@ -19,6 +19,7 @@
     <p:sldId id="297" r:id="rId10"/>
     <p:sldId id="299" r:id="rId11"/>
     <p:sldId id="257" r:id="rId12"/>
+    <p:sldId id="306" r:id="rId13"/>
   </p:sldIdLst>
   <p:sldSz cx="12192000" cy="6858000"/>
   <p:notesSz cx="6858000" cy="9144000"/>
@@ -207,7 +208,7 @@
           <a:p>
             <a:fld id="{49166821-6C76-43B4-90ED-EC04C965C0EE}" type="datetimeFigureOut">
               <a:rPr lang="en-US" smtClean="0"/>
-              <a:t>9/7/2023</a:t>
+              <a:t>2/29/2024</a:t>
             </a:fld>
             <a:endParaRPr lang="en-US"/>
           </a:p>
@@ -800,6 +801,94 @@
 </p:notes>
 </file>
 
+<file path=ppt/notesSlides/notesSlide12.xml><?xml version="1.0" encoding="utf-8"?>
+<p:notes xmlns:a="http://schemas.openxmlformats.org/drawingml/2006/main" xmlns:r="http://schemas.openxmlformats.org/officeDocument/2006/relationships" xmlns:p="http://schemas.openxmlformats.org/presentationml/2006/main">
+  <p:cSld>
+    <p:spTree>
+      <p:nvGrpSpPr>
+        <p:cNvPr id="1" name=""/>
+        <p:cNvGrpSpPr/>
+        <p:nvPr/>
+      </p:nvGrpSpPr>
+      <p:grpSpPr>
+        <a:xfrm>
+          <a:off x="0" y="0"/>
+          <a:ext cx="0" cy="0"/>
+          <a:chOff x="0" y="0"/>
+          <a:chExt cx="0" cy="0"/>
+        </a:xfrm>
+      </p:grpSpPr>
+      <p:sp>
+        <p:nvSpPr>
+          <p:cNvPr id="2" name="Slide Image Placeholder 1"/>
+          <p:cNvSpPr>
+            <a:spLocks noGrp="1" noRot="1" noChangeAspect="1"/>
+          </p:cNvSpPr>
+          <p:nvPr>
+            <p:ph type="sldImg"/>
+          </p:nvPr>
+        </p:nvSpPr>
+        <p:spPr/>
+      </p:sp>
+      <p:sp>
+        <p:nvSpPr>
+          <p:cNvPr id="3" name="Notes Placeholder 2"/>
+          <p:cNvSpPr>
+            <a:spLocks noGrp="1"/>
+          </p:cNvSpPr>
+          <p:nvPr>
+            <p:ph type="body" idx="1"/>
+          </p:nvPr>
+        </p:nvSpPr>
+        <p:spPr/>
+        <p:txBody>
+          <a:bodyPr/>
+          <a:lstStyle/>
+          <a:p>
+            <a:pPr marL="0" indent="0">
+              <a:buFont typeface="Arial" panose="020B0604020202020204" pitchFamily="34" charset="0"/>
+              <a:buNone/>
+            </a:pPr>
+            <a:endParaRPr lang="en-US" dirty="0"/>
+          </a:p>
+        </p:txBody>
+      </p:sp>
+      <p:sp>
+        <p:nvSpPr>
+          <p:cNvPr id="4" name="Slide Number Placeholder 3"/>
+          <p:cNvSpPr>
+            <a:spLocks noGrp="1"/>
+          </p:cNvSpPr>
+          <p:nvPr>
+            <p:ph type="sldNum" sz="quarter" idx="5"/>
+          </p:nvPr>
+        </p:nvSpPr>
+        <p:spPr/>
+        <p:txBody>
+          <a:bodyPr/>
+          <a:lstStyle/>
+          <a:p>
+            <a:fld id="{58794465-180C-46F3-B270-18D6C421C221}" type="slidenum">
+              <a:rPr lang="en-US" smtClean="0"/>
+              <a:t>12</a:t>
+            </a:fld>
+            <a:endParaRPr lang="en-US"/>
+          </a:p>
+        </p:txBody>
+      </p:sp>
+    </p:spTree>
+    <p:extLst>
+      <p:ext uri="{BB962C8B-B14F-4D97-AF65-F5344CB8AC3E}">
+        <p14:creationId xmlns:p14="http://schemas.microsoft.com/office/powerpoint/2010/main" val="3608611899"/>
+      </p:ext>
+    </p:extLst>
+  </p:cSld>
+  <p:clrMapOvr>
+    <a:masterClrMapping/>
+  </p:clrMapOvr>
+</p:notes>
+</file>
+
 <file path=ppt/notesSlides/notesSlide2.xml><?xml version="1.0" encoding="utf-8"?>
 <p:notes xmlns:a="http://schemas.openxmlformats.org/drawingml/2006/main" xmlns:r="http://schemas.openxmlformats.org/officeDocument/2006/relationships" xmlns:p="http://schemas.openxmlformats.org/presentationml/2006/main">
   <p:cSld>
@@ -1957,7 +2046,7 @@
           <a:p>
             <a:fld id="{9ED8E289-1C12-4E95-8FE8-FF2F994E0C49}" type="datetimeFigureOut">
               <a:rPr lang="en-US" smtClean="0"/>
-              <a:t>9/7/2023</a:t>
+              <a:t>2/29/2024</a:t>
             </a:fld>
             <a:endParaRPr lang="en-US"/>
           </a:p>
@@ -2155,7 +2244,7 @@
           <a:p>
             <a:fld id="{9ED8E289-1C12-4E95-8FE8-FF2F994E0C49}" type="datetimeFigureOut">
               <a:rPr lang="en-US" smtClean="0"/>
-              <a:t>9/7/2023</a:t>
+              <a:t>2/29/2024</a:t>
             </a:fld>
             <a:endParaRPr lang="en-US"/>
           </a:p>
@@ -2363,7 +2452,7 @@
           <a:p>
             <a:fld id="{9ED8E289-1C12-4E95-8FE8-FF2F994E0C49}" type="datetimeFigureOut">
               <a:rPr lang="en-US" smtClean="0"/>
-              <a:t>9/7/2023</a:t>
+              <a:t>2/29/2024</a:t>
             </a:fld>
             <a:endParaRPr lang="en-US"/>
           </a:p>
@@ -2561,7 +2650,7 @@
           <a:p>
             <a:fld id="{9ED8E289-1C12-4E95-8FE8-FF2F994E0C49}" type="datetimeFigureOut">
               <a:rPr lang="en-US" smtClean="0"/>
-              <a:t>9/7/2023</a:t>
+              <a:t>2/29/2024</a:t>
             </a:fld>
             <a:endParaRPr lang="en-US"/>
           </a:p>
@@ -2836,7 +2925,7 @@
           <a:p>
             <a:fld id="{9ED8E289-1C12-4E95-8FE8-FF2F994E0C49}" type="datetimeFigureOut">
               <a:rPr lang="en-US" smtClean="0"/>
-              <a:t>9/7/2023</a:t>
+              <a:t>2/29/2024</a:t>
             </a:fld>
             <a:endParaRPr lang="en-US"/>
           </a:p>
@@ -3101,7 +3190,7 @@
           <a:p>
             <a:fld id="{9ED8E289-1C12-4E95-8FE8-FF2F994E0C49}" type="datetimeFigureOut">
               <a:rPr lang="en-US" smtClean="0"/>
-              <a:t>9/7/2023</a:t>
+              <a:t>2/29/2024</a:t>
             </a:fld>
             <a:endParaRPr lang="en-US"/>
           </a:p>
@@ -3513,7 +3602,7 @@
           <a:p>
             <a:fld id="{9ED8E289-1C12-4E95-8FE8-FF2F994E0C49}" type="datetimeFigureOut">
               <a:rPr lang="en-US" smtClean="0"/>
-              <a:t>9/7/2023</a:t>
+              <a:t>2/29/2024</a:t>
             </a:fld>
             <a:endParaRPr lang="en-US"/>
           </a:p>
@@ -3654,7 +3743,7 @@
           <a:p>
             <a:fld id="{9ED8E289-1C12-4E95-8FE8-FF2F994E0C49}" type="datetimeFigureOut">
               <a:rPr lang="en-US" smtClean="0"/>
-              <a:t>9/7/2023</a:t>
+              <a:t>2/29/2024</a:t>
             </a:fld>
             <a:endParaRPr lang="en-US"/>
           </a:p>
@@ -3767,7 +3856,7 @@
           <a:p>
             <a:fld id="{9ED8E289-1C12-4E95-8FE8-FF2F994E0C49}" type="datetimeFigureOut">
               <a:rPr lang="en-US" smtClean="0"/>
-              <a:t>9/7/2023</a:t>
+              <a:t>2/29/2024</a:t>
             </a:fld>
             <a:endParaRPr lang="en-US"/>
           </a:p>
@@ -4078,7 +4167,7 @@
           <a:p>
             <a:fld id="{9ED8E289-1C12-4E95-8FE8-FF2F994E0C49}" type="datetimeFigureOut">
               <a:rPr lang="en-US" smtClean="0"/>
-              <a:t>9/7/2023</a:t>
+              <a:t>2/29/2024</a:t>
             </a:fld>
             <a:endParaRPr lang="en-US"/>
           </a:p>
@@ -4366,7 +4455,7 @@
           <a:p>
             <a:fld id="{9ED8E289-1C12-4E95-8FE8-FF2F994E0C49}" type="datetimeFigureOut">
               <a:rPr lang="en-US" smtClean="0"/>
-              <a:t>9/7/2023</a:t>
+              <a:t>2/29/2024</a:t>
             </a:fld>
             <a:endParaRPr lang="en-US"/>
           </a:p>
@@ -4607,7 +4696,7 @@
           <a:p>
             <a:fld id="{9ED8E289-1C12-4E95-8FE8-FF2F994E0C49}" type="datetimeFigureOut">
               <a:rPr lang="en-US" smtClean="0"/>
-              <a:t>9/7/2023</a:t>
+              <a:t>2/29/2024</a:t>
             </a:fld>
             <a:endParaRPr lang="en-US"/>
           </a:p>
@@ -5213,13 +5302,13 @@
   <p:clrMapOvr>
     <a:masterClrMapping/>
   </p:clrMapOvr>
-  <mc:AlternateContent xmlns:mc="http://schemas.openxmlformats.org/markup-compatibility/2006">
-    <mc:Choice xmlns:p159="http://schemas.microsoft.com/office/powerpoint/2015/09/main" Requires="p159">
+  <mc:AlternateContent xmlns:mc="http://schemas.openxmlformats.org/markup-compatibility/2006" xmlns:p159="http://schemas.microsoft.com/office/powerpoint/2015/09/main">
+    <mc:Choice Requires="p159">
       <p:transition xmlns:p14="http://schemas.microsoft.com/office/powerpoint/2010/main" spd="slow" p14:dur="2000">
         <p159:morph option="byObject"/>
       </p:transition>
     </mc:Choice>
-    <mc:Fallback>
+    <mc:Fallback xmlns="">
       <p:transition spd="slow">
         <p:fade/>
       </p:transition>
@@ -6055,13 +6144,13 @@
   <p:clrMapOvr>
     <a:masterClrMapping/>
   </p:clrMapOvr>
-  <mc:AlternateContent xmlns:mc="http://schemas.openxmlformats.org/markup-compatibility/2006">
-    <mc:Choice xmlns:p159="http://schemas.microsoft.com/office/powerpoint/2015/09/main" Requires="p159">
+  <mc:AlternateContent xmlns:mc="http://schemas.openxmlformats.org/markup-compatibility/2006" xmlns:p159="http://schemas.microsoft.com/office/powerpoint/2015/09/main">
+    <mc:Choice Requires="p159">
       <p:transition xmlns:p14="http://schemas.microsoft.com/office/powerpoint/2010/main" spd="slow" p14:dur="2000">
         <p159:morph option="byObject"/>
       </p:transition>
     </mc:Choice>
-    <mc:Fallback>
+    <mc:Fallback xmlns="">
       <p:transition spd="slow">
         <p:fade/>
       </p:transition>
@@ -6412,13 +6501,13 @@
   <p:clrMapOvr>
     <a:masterClrMapping/>
   </p:clrMapOvr>
-  <mc:AlternateContent xmlns:mc="http://schemas.openxmlformats.org/markup-compatibility/2006">
-    <mc:Choice xmlns:p159="http://schemas.microsoft.com/office/powerpoint/2015/09/main" Requires="p159">
+  <mc:AlternateContent xmlns:mc="http://schemas.openxmlformats.org/markup-compatibility/2006" xmlns:p159="http://schemas.microsoft.com/office/powerpoint/2015/09/main">
+    <mc:Choice Requires="p159">
       <p:transition xmlns:p14="http://schemas.microsoft.com/office/powerpoint/2010/main" spd="slow" p14:dur="2000">
         <p159:morph option="byObject"/>
       </p:transition>
     </mc:Choice>
-    <mc:Fallback>
+    <mc:Fallback xmlns="">
       <p:transition spd="slow">
         <p:fade/>
       </p:transition>
@@ -6545,6 +6634,187 @@
       </p:par>
     </p:tnLst>
   </p:timing>
+</p:sld>
+</file>
+
+<file path=ppt/slides/slide12.xml><?xml version="1.0" encoding="utf-8"?>
+<p:sld xmlns:a="http://schemas.openxmlformats.org/drawingml/2006/main" xmlns:r="http://schemas.openxmlformats.org/officeDocument/2006/relationships" xmlns:p="http://schemas.openxmlformats.org/presentationml/2006/main">
+  <p:cSld>
+    <p:bg>
+      <p:bgPr>
+        <a:solidFill>
+          <a:schemeClr val="bg1">
+            <a:lumMod val="90000"/>
+            <a:lumOff val="10000"/>
+          </a:schemeClr>
+        </a:solidFill>
+        <a:effectLst/>
+      </p:bgPr>
+    </p:bg>
+    <p:spTree>
+      <p:nvGrpSpPr>
+        <p:cNvPr id="1" name=""/>
+        <p:cNvGrpSpPr/>
+        <p:nvPr/>
+      </p:nvGrpSpPr>
+      <p:grpSpPr>
+        <a:xfrm>
+          <a:off x="0" y="0"/>
+          <a:ext cx="0" cy="0"/>
+          <a:chOff x="0" y="0"/>
+          <a:chExt cx="0" cy="0"/>
+        </a:xfrm>
+      </p:grpSpPr>
+      <p:sp>
+        <p:nvSpPr>
+          <p:cNvPr id="2" name="Title 1">
+            <a:extLst>
+              <a:ext uri="{FF2B5EF4-FFF2-40B4-BE49-F238E27FC236}">
+                <a16:creationId xmlns:a16="http://schemas.microsoft.com/office/drawing/2014/main" id="{4DD820D6-5715-AFD0-11FC-17CC585EBE2B}"/>
+              </a:ext>
+            </a:extLst>
+          </p:cNvPr>
+          <p:cNvSpPr>
+            <a:spLocks noGrp="1"/>
+          </p:cNvSpPr>
+          <p:nvPr>
+            <p:ph type="title"/>
+          </p:nvPr>
+        </p:nvSpPr>
+        <p:spPr>
+          <a:xfrm>
+            <a:off x="0" y="1"/>
+            <a:ext cx="12192000" cy="1120140"/>
+          </a:xfrm>
+        </p:spPr>
+        <p:txBody>
+          <a:bodyPr/>
+          <a:lstStyle/>
+          <a:p>
+            <a:pPr algn="ctr"/>
+            <a:r>
+              <a:rPr lang="en-US" dirty="0"/>
+              <a:t>Go to</a:t>
+            </a:r>
+            <a:r>
+              <a:rPr lang="en-US" b="1" dirty="0"/>
+              <a:t> tinyurl.com/</a:t>
+            </a:r>
+            <a:r>
+              <a:rPr lang="en-US" b="1" dirty="0" err="1"/>
+              <a:t>ucspy</a:t>
+            </a:r>
+            <a:endParaRPr lang="en-US" b="1" dirty="0"/>
+          </a:p>
+        </p:txBody>
+      </p:sp>
+      <p:pic>
+        <p:nvPicPr>
+          <p:cNvPr id="5" name="Picture 4">
+            <a:extLst>
+              <a:ext uri="{FF2B5EF4-FFF2-40B4-BE49-F238E27FC236}">
+                <a16:creationId xmlns:a16="http://schemas.microsoft.com/office/drawing/2014/main" id="{C3D79FA3-CA32-AC9F-3813-BCDA12D9B547}"/>
+              </a:ext>
+            </a:extLst>
+          </p:cNvPr>
+          <p:cNvPicPr>
+            <a:picLocks noChangeAspect="1"/>
+          </p:cNvPicPr>
+          <p:nvPr/>
+        </p:nvPicPr>
+        <p:blipFill>
+          <a:blip r:embed="rId3"/>
+          <a:stretch>
+            <a:fillRect/>
+          </a:stretch>
+        </p:blipFill>
+        <p:spPr>
+          <a:xfrm>
+            <a:off x="0" y="1120141"/>
+            <a:ext cx="12192000" cy="4762999"/>
+          </a:xfrm>
+          <a:prstGeom prst="rect">
+            <a:avLst/>
+          </a:prstGeom>
+        </p:spPr>
+      </p:pic>
+      <p:sp>
+        <p:nvSpPr>
+          <p:cNvPr id="6" name="Title 1">
+            <a:extLst>
+              <a:ext uri="{FF2B5EF4-FFF2-40B4-BE49-F238E27FC236}">
+                <a16:creationId xmlns:a16="http://schemas.microsoft.com/office/drawing/2014/main" id="{474CADB9-3632-F95E-8DCE-8B7DC57130CE}"/>
+              </a:ext>
+            </a:extLst>
+          </p:cNvPr>
+          <p:cNvSpPr txBox="1">
+            <a:spLocks/>
+          </p:cNvSpPr>
+          <p:nvPr/>
+        </p:nvSpPr>
+        <p:spPr>
+          <a:xfrm>
+            <a:off x="0" y="6111740"/>
+            <a:ext cx="12192000" cy="560070"/>
+          </a:xfrm>
+          <a:prstGeom prst="rect">
+            <a:avLst/>
+          </a:prstGeom>
+        </p:spPr>
+        <p:txBody>
+          <a:bodyPr vert="horz" lIns="91440" tIns="45720" rIns="91440" bIns="45720" rtlCol="0" anchor="ctr">
+            <a:normAutofit/>
+          </a:bodyPr>
+          <a:lstStyle>
+            <a:lvl1pPr algn="l" defTabSz="914400" rtl="0" eaLnBrk="1" latinLnBrk="0" hangingPunct="1">
+              <a:lnSpc>
+                <a:spcPct val="90000"/>
+              </a:lnSpc>
+              <a:spcBef>
+                <a:spcPct val="0"/>
+              </a:spcBef>
+              <a:buNone/>
+              <a:defRPr sz="4400" kern="1200">
+                <a:solidFill>
+                  <a:schemeClr val="tx1"/>
+                </a:solidFill>
+                <a:latin typeface="+mj-lt"/>
+                <a:ea typeface="+mj-ea"/>
+                <a:cs typeface="+mj-cs"/>
+              </a:defRPr>
+            </a:lvl1pPr>
+          </a:lstStyle>
+          <a:p>
+            <a:pPr algn="ctr"/>
+            <a:r>
+              <a:rPr lang="en-US" sz="2400" i="1" dirty="0"/>
+              <a:t>🔖 please bookmark the page 🔖</a:t>
+            </a:r>
+          </a:p>
+        </p:txBody>
+      </p:sp>
+    </p:spTree>
+    <p:extLst>
+      <p:ext uri="{BB962C8B-B14F-4D97-AF65-F5344CB8AC3E}">
+        <p14:creationId xmlns:p14="http://schemas.microsoft.com/office/powerpoint/2010/main" val="2526916344"/>
+      </p:ext>
+    </p:extLst>
+  </p:cSld>
+  <p:clrMapOvr>
+    <a:masterClrMapping/>
+  </p:clrMapOvr>
+  <mc:AlternateContent xmlns:mc="http://schemas.openxmlformats.org/markup-compatibility/2006">
+    <mc:Choice xmlns:p159="http://schemas.microsoft.com/office/powerpoint/2015/09/main" Requires="p159">
+      <p:transition xmlns:p14="http://schemas.microsoft.com/office/powerpoint/2010/main" spd="slow" p14:dur="2000">
+        <p159:morph option="byObject"/>
+      </p:transition>
+    </mc:Choice>
+    <mc:Fallback>
+      <p:transition spd="slow">
+        <p:fade/>
+      </p:transition>
+    </mc:Fallback>
+  </mc:AlternateContent>
 </p:sld>
 </file>
 
@@ -6897,13 +7167,13 @@
   <p:clrMapOvr>
     <a:masterClrMapping/>
   </p:clrMapOvr>
-  <mc:AlternateContent xmlns:mc="http://schemas.openxmlformats.org/markup-compatibility/2006">
-    <mc:Choice xmlns:p159="http://schemas.microsoft.com/office/powerpoint/2015/09/main" Requires="p159">
+  <mc:AlternateContent xmlns:mc="http://schemas.openxmlformats.org/markup-compatibility/2006" xmlns:p159="http://schemas.microsoft.com/office/powerpoint/2015/09/main">
+    <mc:Choice Requires="p159">
       <p:transition xmlns:p14="http://schemas.microsoft.com/office/powerpoint/2010/main" spd="slow" p14:dur="2000">
         <p159:morph option="byObject"/>
       </p:transition>
     </mc:Choice>
-    <mc:Fallback>
+    <mc:Fallback xmlns="">
       <p:transition spd="slow">
         <p:fade/>
       </p:transition>
@@ -7891,13 +8161,13 @@
   <p:clrMapOvr>
     <a:masterClrMapping/>
   </p:clrMapOvr>
-  <mc:AlternateContent xmlns:mc="http://schemas.openxmlformats.org/markup-compatibility/2006">
-    <mc:Choice xmlns:p159="http://schemas.microsoft.com/office/powerpoint/2015/09/main" Requires="p159">
+  <mc:AlternateContent xmlns:mc="http://schemas.openxmlformats.org/markup-compatibility/2006" xmlns:p159="http://schemas.microsoft.com/office/powerpoint/2015/09/main">
+    <mc:Choice Requires="p159">
       <p:transition xmlns:p14="http://schemas.microsoft.com/office/powerpoint/2010/main" spd="slow" p14:dur="2000">
         <p159:morph option="byObject"/>
       </p:transition>
     </mc:Choice>
-    <mc:Fallback>
+    <mc:Fallback xmlns="">
       <p:transition spd="slow">
         <p:fade/>
       </p:transition>
@@ -11332,13 +11602,13 @@
   <p:clrMapOvr>
     <a:masterClrMapping/>
   </p:clrMapOvr>
-  <mc:AlternateContent xmlns:mc="http://schemas.openxmlformats.org/markup-compatibility/2006">
-    <mc:Choice xmlns:p159="http://schemas.microsoft.com/office/powerpoint/2015/09/main" Requires="p159">
+  <mc:AlternateContent xmlns:mc="http://schemas.openxmlformats.org/markup-compatibility/2006" xmlns:p159="http://schemas.microsoft.com/office/powerpoint/2015/09/main">
+    <mc:Choice Requires="p159">
       <p:transition xmlns:p14="http://schemas.microsoft.com/office/powerpoint/2010/main" spd="slow" p14:dur="2000">
         <p159:morph option="byObject"/>
       </p:transition>
     </mc:Choice>
-    <mc:Fallback>
+    <mc:Fallback xmlns="">
       <p:transition spd="slow">
         <p:fade/>
       </p:transition>
@@ -12274,13 +12544,13 @@
   <p:clrMapOvr>
     <a:masterClrMapping/>
   </p:clrMapOvr>
-  <mc:AlternateContent xmlns:mc="http://schemas.openxmlformats.org/markup-compatibility/2006">
-    <mc:Choice xmlns:p159="http://schemas.microsoft.com/office/powerpoint/2015/09/main" Requires="p159">
+  <mc:AlternateContent xmlns:mc="http://schemas.openxmlformats.org/markup-compatibility/2006" xmlns:p159="http://schemas.microsoft.com/office/powerpoint/2015/09/main">
+    <mc:Choice Requires="p159">
       <p:transition xmlns:p14="http://schemas.microsoft.com/office/powerpoint/2010/main" spd="slow" p14:dur="2000">
         <p159:morph option="byObject"/>
       </p:transition>
     </mc:Choice>
-    <mc:Fallback>
+    <mc:Fallback xmlns="">
       <p:transition spd="slow">
         <p:fade/>
       </p:transition>
@@ -15933,13 +16203,13 @@
   <p:clrMapOvr>
     <a:masterClrMapping/>
   </p:clrMapOvr>
-  <mc:AlternateContent xmlns:mc="http://schemas.openxmlformats.org/markup-compatibility/2006">
-    <mc:Choice xmlns:p159="http://schemas.microsoft.com/office/powerpoint/2015/09/main" Requires="p159">
+  <mc:AlternateContent xmlns:mc="http://schemas.openxmlformats.org/markup-compatibility/2006" xmlns:p159="http://schemas.microsoft.com/office/powerpoint/2015/09/main">
+    <mc:Choice Requires="p159">
       <p:transition xmlns:p14="http://schemas.microsoft.com/office/powerpoint/2010/main" spd="slow" p14:dur="2000">
         <p159:morph option="byObject"/>
       </p:transition>
     </mc:Choice>
-    <mc:Fallback>
+    <mc:Fallback xmlns="">
       <p:transition spd="slow">
         <p:fade/>
       </p:transition>
@@ -16528,13 +16798,13 @@
   <p:clrMapOvr>
     <a:masterClrMapping/>
   </p:clrMapOvr>
-  <mc:AlternateContent xmlns:mc="http://schemas.openxmlformats.org/markup-compatibility/2006">
-    <mc:Choice xmlns:p159="http://schemas.microsoft.com/office/powerpoint/2015/09/main" Requires="p159">
+  <mc:AlternateContent xmlns:mc="http://schemas.openxmlformats.org/markup-compatibility/2006" xmlns:p159="http://schemas.microsoft.com/office/powerpoint/2015/09/main">
+    <mc:Choice Requires="p159">
       <p:transition xmlns:p14="http://schemas.microsoft.com/office/powerpoint/2010/main" spd="slow" p14:dur="2000">
         <p159:morph option="byObject"/>
       </p:transition>
     </mc:Choice>
-    <mc:Fallback>
+    <mc:Fallback xmlns="">
       <p:transition spd="slow">
         <p:fade/>
       </p:transition>
@@ -17280,13 +17550,13 @@
   <p:clrMapOvr>
     <a:masterClrMapping/>
   </p:clrMapOvr>
-  <mc:AlternateContent xmlns:mc="http://schemas.openxmlformats.org/markup-compatibility/2006">
-    <mc:Choice xmlns:p159="http://schemas.microsoft.com/office/powerpoint/2015/09/main" Requires="p159">
+  <mc:AlternateContent xmlns:mc="http://schemas.openxmlformats.org/markup-compatibility/2006" xmlns:p159="http://schemas.microsoft.com/office/powerpoint/2015/09/main">
+    <mc:Choice Requires="p159">
       <p:transition xmlns:p14="http://schemas.microsoft.com/office/powerpoint/2010/main" spd="slow" p14:dur="2000">
         <p159:morph option="byObject"/>
       </p:transition>
     </mc:Choice>
-    <mc:Fallback>
+    <mc:Fallback xmlns="">
       <p:transition spd="slow">
         <p:fade/>
       </p:transition>
@@ -18378,13 +18648,13 @@
   <p:clrMapOvr>
     <a:masterClrMapping/>
   </p:clrMapOvr>
-  <mc:AlternateContent xmlns:mc="http://schemas.openxmlformats.org/markup-compatibility/2006">
-    <mc:Choice xmlns:p159="http://schemas.microsoft.com/office/powerpoint/2015/09/main" Requires="p159">
+  <mc:AlternateContent xmlns:mc="http://schemas.openxmlformats.org/markup-compatibility/2006" xmlns:p159="http://schemas.microsoft.com/office/powerpoint/2015/09/main">
+    <mc:Choice Requires="p159">
       <p:transition xmlns:p14="http://schemas.microsoft.com/office/powerpoint/2010/main" spd="slow" p14:dur="2000">
         <p159:morph option="byObject"/>
       </p:transition>
     </mc:Choice>
-    <mc:Fallback>
+    <mc:Fallback xmlns="">
       <p:transition spd="slow">
         <p:fade/>
       </p:transition>

</xml_diff>